<commit_message>
Changed cell descirption. Added dash
</commit_message>
<xml_diff>
--- a/Results/Figure5/Figure5.pptx
+++ b/Results/Figure5/Figure5.pptx
@@ -104,6 +104,11 @@
       </a:defRPr>
     </a:lvl9pPr>
   </p:defaultTextStyle>
+  <p:extLst>
+    <p:ext uri="{EFAFB233-063F-42B5-8137-9DF3F51BA10A}">
+      <p15:sldGuideLst xmlns:p15="http://schemas.microsoft.com/office/powerpoint/2012/main"/>
+    </p:ext>
+  </p:extLst>
 </p:presentation>
 </file>
 
@@ -238,7 +243,7 @@
           <a:p>
             <a:fld id="{F51C2E22-06A7-4615-9A38-67DD59A8AF17}" type="datetimeFigureOut">
               <a:rPr lang="en-GB" smtClean="0"/>
-              <a:t>26/02/2024</a:t>
+              <a:t>07/11/2024</a:t>
             </a:fld>
             <a:endParaRPr lang="en-GB"/>
           </a:p>
@@ -408,7 +413,7 @@
           <a:p>
             <a:fld id="{F51C2E22-06A7-4615-9A38-67DD59A8AF17}" type="datetimeFigureOut">
               <a:rPr lang="en-GB" smtClean="0"/>
-              <a:t>26/02/2024</a:t>
+              <a:t>07/11/2024</a:t>
             </a:fld>
             <a:endParaRPr lang="en-GB"/>
           </a:p>
@@ -588,7 +593,7 @@
           <a:p>
             <a:fld id="{F51C2E22-06A7-4615-9A38-67DD59A8AF17}" type="datetimeFigureOut">
               <a:rPr lang="en-GB" smtClean="0"/>
-              <a:t>26/02/2024</a:t>
+              <a:t>07/11/2024</a:t>
             </a:fld>
             <a:endParaRPr lang="en-GB"/>
           </a:p>
@@ -758,7 +763,7 @@
           <a:p>
             <a:fld id="{F51C2E22-06A7-4615-9A38-67DD59A8AF17}" type="datetimeFigureOut">
               <a:rPr lang="en-GB" smtClean="0"/>
-              <a:t>26/02/2024</a:t>
+              <a:t>07/11/2024</a:t>
             </a:fld>
             <a:endParaRPr lang="en-GB"/>
           </a:p>
@@ -1002,7 +1007,7 @@
           <a:p>
             <a:fld id="{F51C2E22-06A7-4615-9A38-67DD59A8AF17}" type="datetimeFigureOut">
               <a:rPr lang="en-GB" smtClean="0"/>
-              <a:t>26/02/2024</a:t>
+              <a:t>07/11/2024</a:t>
             </a:fld>
             <a:endParaRPr lang="en-GB"/>
           </a:p>
@@ -1234,7 +1239,7 @@
           <a:p>
             <a:fld id="{F51C2E22-06A7-4615-9A38-67DD59A8AF17}" type="datetimeFigureOut">
               <a:rPr lang="en-GB" smtClean="0"/>
-              <a:t>26/02/2024</a:t>
+              <a:t>07/11/2024</a:t>
             </a:fld>
             <a:endParaRPr lang="en-GB"/>
           </a:p>
@@ -1601,7 +1606,7 @@
           <a:p>
             <a:fld id="{F51C2E22-06A7-4615-9A38-67DD59A8AF17}" type="datetimeFigureOut">
               <a:rPr lang="en-GB" smtClean="0"/>
-              <a:t>26/02/2024</a:t>
+              <a:t>07/11/2024</a:t>
             </a:fld>
             <a:endParaRPr lang="en-GB"/>
           </a:p>
@@ -1719,7 +1724,7 @@
           <a:p>
             <a:fld id="{F51C2E22-06A7-4615-9A38-67DD59A8AF17}" type="datetimeFigureOut">
               <a:rPr lang="en-GB" smtClean="0"/>
-              <a:t>26/02/2024</a:t>
+              <a:t>07/11/2024</a:t>
             </a:fld>
             <a:endParaRPr lang="en-GB"/>
           </a:p>
@@ -1814,7 +1819,7 @@
           <a:p>
             <a:fld id="{F51C2E22-06A7-4615-9A38-67DD59A8AF17}" type="datetimeFigureOut">
               <a:rPr lang="en-GB" smtClean="0"/>
-              <a:t>26/02/2024</a:t>
+              <a:t>07/11/2024</a:t>
             </a:fld>
             <a:endParaRPr lang="en-GB"/>
           </a:p>
@@ -2091,7 +2096,7 @@
           <a:p>
             <a:fld id="{F51C2E22-06A7-4615-9A38-67DD59A8AF17}" type="datetimeFigureOut">
               <a:rPr lang="en-GB" smtClean="0"/>
-              <a:t>26/02/2024</a:t>
+              <a:t>07/11/2024</a:t>
             </a:fld>
             <a:endParaRPr lang="en-GB"/>
           </a:p>
@@ -2348,7 +2353,7 @@
           <a:p>
             <a:fld id="{F51C2E22-06A7-4615-9A38-67DD59A8AF17}" type="datetimeFigureOut">
               <a:rPr lang="en-GB" smtClean="0"/>
-              <a:t>26/02/2024</a:t>
+              <a:t>07/11/2024</a:t>
             </a:fld>
             <a:endParaRPr lang="en-GB"/>
           </a:p>
@@ -2561,7 +2566,7 @@
           <a:p>
             <a:fld id="{F51C2E22-06A7-4615-9A38-67DD59A8AF17}" type="datetimeFigureOut">
               <a:rPr lang="en-GB" smtClean="0"/>
-              <a:t>26/02/2024</a:t>
+              <a:t>07/11/2024</a:t>
             </a:fld>
             <a:endParaRPr lang="en-GB"/>
           </a:p>
@@ -3056,574 +3061,6 @@
           </a:prstGeom>
         </p:spPr>
       </p:pic>
-      <p:pic>
-        <p:nvPicPr>
-          <p:cNvPr id="38" name="Grafik 37"/>
-          <p:cNvPicPr>
-            <a:picLocks noChangeAspect="1"/>
-          </p:cNvPicPr>
-          <p:nvPr/>
-        </p:nvPicPr>
-        <p:blipFill>
-          <a:blip r:embed="rId5" cstate="print">
-            <a:extLst>
-              <a:ext uri="{28A0092B-C50C-407E-A947-70E740481C1C}">
-                <a14:useLocalDpi xmlns:a14="http://schemas.microsoft.com/office/drawing/2010/main" val="0"/>
-              </a:ext>
-            </a:extLst>
-          </a:blip>
-          <a:stretch>
-            <a:fillRect/>
-          </a:stretch>
-        </p:blipFill>
-        <p:spPr>
-          <a:xfrm>
-            <a:off x="4398231" y="5214718"/>
-            <a:ext cx="720000" cy="960000"/>
-          </a:xfrm>
-          <a:prstGeom prst="rect">
-            <a:avLst/>
-          </a:prstGeom>
-        </p:spPr>
-      </p:pic>
-      <p:pic>
-        <p:nvPicPr>
-          <p:cNvPr id="39" name="Grafik 38"/>
-          <p:cNvPicPr>
-            <a:picLocks noChangeAspect="1"/>
-          </p:cNvPicPr>
-          <p:nvPr/>
-        </p:nvPicPr>
-        <p:blipFill>
-          <a:blip r:embed="rId6" cstate="print">
-            <a:extLst>
-              <a:ext uri="{28A0092B-C50C-407E-A947-70E740481C1C}">
-                <a14:useLocalDpi xmlns:a14="http://schemas.microsoft.com/office/drawing/2010/main" val="0"/>
-              </a:ext>
-            </a:extLst>
-          </a:blip>
-          <a:stretch>
-            <a:fillRect/>
-          </a:stretch>
-        </p:blipFill>
-        <p:spPr>
-          <a:xfrm>
-            <a:off x="4398231" y="2947758"/>
-            <a:ext cx="720000" cy="960000"/>
-          </a:xfrm>
-          <a:prstGeom prst="rect">
-            <a:avLst/>
-          </a:prstGeom>
-        </p:spPr>
-      </p:pic>
-      <p:pic>
-        <p:nvPicPr>
-          <p:cNvPr id="41" name="Grafik 40"/>
-          <p:cNvPicPr>
-            <a:picLocks noChangeAspect="1"/>
-          </p:cNvPicPr>
-          <p:nvPr/>
-        </p:nvPicPr>
-        <p:blipFill>
-          <a:blip r:embed="rId7" cstate="print">
-            <a:extLst>
-              <a:ext uri="{28A0092B-C50C-407E-A947-70E740481C1C}">
-                <a14:useLocalDpi xmlns:a14="http://schemas.microsoft.com/office/drawing/2010/main" val="0"/>
-              </a:ext>
-            </a:extLst>
-          </a:blip>
-          <a:stretch>
-            <a:fillRect/>
-          </a:stretch>
-        </p:blipFill>
-        <p:spPr>
-          <a:xfrm>
-            <a:off x="4398231" y="699732"/>
-            <a:ext cx="720000" cy="960000"/>
-          </a:xfrm>
-          <a:prstGeom prst="rect">
-            <a:avLst/>
-          </a:prstGeom>
-        </p:spPr>
-      </p:pic>
-      <p:pic>
-        <p:nvPicPr>
-          <p:cNvPr id="42" name="Grafik 41"/>
-          <p:cNvPicPr>
-            <a:picLocks noChangeAspect="1"/>
-          </p:cNvPicPr>
-          <p:nvPr/>
-        </p:nvPicPr>
-        <p:blipFill rotWithShape="1">
-          <a:blip r:embed="rId8" cstate="print">
-            <a:extLst>
-              <a:ext uri="{28A0092B-C50C-407E-A947-70E740481C1C}">
-                <a14:useLocalDpi xmlns:a14="http://schemas.microsoft.com/office/drawing/2010/main" val="0"/>
-              </a:ext>
-            </a:extLst>
-          </a:blip>
-          <a:srcRect b="9687"/>
-          <a:stretch/>
-        </p:blipFill>
-        <p:spPr>
-          <a:xfrm>
-            <a:off x="3590933" y="2947758"/>
-            <a:ext cx="720000" cy="867005"/>
-          </a:xfrm>
-          <a:prstGeom prst="rect">
-            <a:avLst/>
-          </a:prstGeom>
-        </p:spPr>
-      </p:pic>
-      <p:sp>
-        <p:nvSpPr>
-          <p:cNvPr id="47" name="Rechteck 46"/>
-          <p:cNvSpPr/>
-          <p:nvPr/>
-        </p:nvSpPr>
-        <p:spPr>
-          <a:xfrm>
-            <a:off x="3590933" y="2914420"/>
-            <a:ext cx="632460" cy="897126"/>
-          </a:xfrm>
-          <a:prstGeom prst="rect">
-            <a:avLst/>
-          </a:prstGeom>
-          <a:noFill/>
-          <a:ln w="9525">
-            <a:solidFill>
-              <a:schemeClr val="tx1"/>
-            </a:solidFill>
-          </a:ln>
-        </p:spPr>
-        <p:style>
-          <a:lnRef idx="2">
-            <a:schemeClr val="accent1">
-              <a:shade val="50000"/>
-            </a:schemeClr>
-          </a:lnRef>
-          <a:fillRef idx="1">
-            <a:schemeClr val="accent1"/>
-          </a:fillRef>
-          <a:effectRef idx="0">
-            <a:schemeClr val="accent1"/>
-          </a:effectRef>
-          <a:fontRef idx="minor">
-            <a:schemeClr val="lt1"/>
-          </a:fontRef>
-        </p:style>
-        <p:txBody>
-          <a:bodyPr rtlCol="0" anchor="ctr"/>
-          <a:lstStyle/>
-          <a:p>
-            <a:pPr algn="ctr"/>
-            <a:endParaRPr lang="en-GB"/>
-          </a:p>
-        </p:txBody>
-      </p:sp>
-      <p:pic>
-        <p:nvPicPr>
-          <p:cNvPr id="43" name="Grafik 42"/>
-          <p:cNvPicPr>
-            <a:picLocks noChangeAspect="1"/>
-          </p:cNvPicPr>
-          <p:nvPr/>
-        </p:nvPicPr>
-        <p:blipFill>
-          <a:blip r:embed="rId9" cstate="print">
-            <a:extLst>
-              <a:ext uri="{28A0092B-C50C-407E-A947-70E740481C1C}">
-                <a14:useLocalDpi xmlns:a14="http://schemas.microsoft.com/office/drawing/2010/main" val="0"/>
-              </a:ext>
-            </a:extLst>
-          </a:blip>
-          <a:stretch>
-            <a:fillRect/>
-          </a:stretch>
-        </p:blipFill>
-        <p:spPr>
-          <a:xfrm>
-            <a:off x="6138000" y="2947758"/>
-            <a:ext cx="720000" cy="960000"/>
-          </a:xfrm>
-          <a:prstGeom prst="rect">
-            <a:avLst/>
-          </a:prstGeom>
-        </p:spPr>
-      </p:pic>
-      <p:grpSp>
-        <p:nvGrpSpPr>
-          <p:cNvPr id="46" name="Gruppieren 45"/>
-          <p:cNvGrpSpPr/>
-          <p:nvPr/>
-        </p:nvGrpSpPr>
-        <p:grpSpPr>
-          <a:xfrm>
-            <a:off x="2313846" y="5214718"/>
-            <a:ext cx="720000" cy="864213"/>
-            <a:chOff x="2358294" y="5271868"/>
-            <a:chExt cx="720000" cy="864213"/>
-          </a:xfrm>
-        </p:grpSpPr>
-        <p:pic>
-          <p:nvPicPr>
-            <p:cNvPr id="44" name="Grafik 43"/>
-            <p:cNvPicPr>
-              <a:picLocks noChangeAspect="1"/>
-            </p:cNvPicPr>
-            <p:nvPr/>
-          </p:nvPicPr>
-          <p:blipFill rotWithShape="1">
-            <a:blip r:embed="rId10" cstate="print">
-              <a:extLst>
-                <a:ext uri="{28A0092B-C50C-407E-A947-70E740481C1C}">
-                  <a14:useLocalDpi xmlns:a14="http://schemas.microsoft.com/office/drawing/2010/main" val="0"/>
-                </a:ext>
-              </a:extLst>
-            </a:blip>
-            <a:srcRect b="31145"/>
-            <a:stretch/>
-          </p:blipFill>
-          <p:spPr>
-            <a:xfrm>
-              <a:off x="2358294" y="5271868"/>
-              <a:ext cx="720000" cy="661013"/>
-            </a:xfrm>
-            <a:prstGeom prst="rect">
-              <a:avLst/>
-            </a:prstGeom>
-          </p:spPr>
-        </p:pic>
-        <p:pic>
-          <p:nvPicPr>
-            <p:cNvPr id="45" name="Grafik 44"/>
-            <p:cNvPicPr>
-              <a:picLocks noChangeAspect="1"/>
-            </p:cNvPicPr>
-            <p:nvPr/>
-          </p:nvPicPr>
-          <p:blipFill rotWithShape="1">
-            <a:blip r:embed="rId10" cstate="print">
-              <a:extLst>
-                <a:ext uri="{28A0092B-C50C-407E-A947-70E740481C1C}">
-                  <a14:useLocalDpi xmlns:a14="http://schemas.microsoft.com/office/drawing/2010/main" val="0"/>
-                </a:ext>
-              </a:extLst>
-            </a:blip>
-            <a:srcRect l="38026" t="68194" r="32870" b="9978"/>
-            <a:stretch/>
-          </p:blipFill>
-          <p:spPr>
-            <a:xfrm>
-              <a:off x="2632075" y="5926531"/>
-              <a:ext cx="209550" cy="209550"/>
-            </a:xfrm>
-            <a:prstGeom prst="rect">
-              <a:avLst/>
-            </a:prstGeom>
-          </p:spPr>
-        </p:pic>
-      </p:grpSp>
-      <p:sp>
-        <p:nvSpPr>
-          <p:cNvPr id="48" name="Rechteck 47"/>
-          <p:cNvSpPr/>
-          <p:nvPr/>
-        </p:nvSpPr>
-        <p:spPr>
-          <a:xfrm>
-            <a:off x="4373203" y="2911088"/>
-            <a:ext cx="744765" cy="897126"/>
-          </a:xfrm>
-          <a:prstGeom prst="rect">
-            <a:avLst/>
-          </a:prstGeom>
-          <a:noFill/>
-          <a:ln w="9525">
-            <a:solidFill>
-              <a:schemeClr val="tx1"/>
-            </a:solidFill>
-          </a:ln>
-        </p:spPr>
-        <p:style>
-          <a:lnRef idx="2">
-            <a:schemeClr val="accent1">
-              <a:shade val="50000"/>
-            </a:schemeClr>
-          </a:lnRef>
-          <a:fillRef idx="1">
-            <a:schemeClr val="accent1"/>
-          </a:fillRef>
-          <a:effectRef idx="0">
-            <a:schemeClr val="accent1"/>
-          </a:effectRef>
-          <a:fontRef idx="minor">
-            <a:schemeClr val="lt1"/>
-          </a:fontRef>
-        </p:style>
-        <p:txBody>
-          <a:bodyPr rtlCol="0" anchor="ctr"/>
-          <a:lstStyle/>
-          <a:p>
-            <a:pPr algn="ctr"/>
-            <a:endParaRPr lang="en-GB"/>
-          </a:p>
-        </p:txBody>
-      </p:sp>
-      <p:sp>
-        <p:nvSpPr>
-          <p:cNvPr id="49" name="Rechteck 48"/>
-          <p:cNvSpPr/>
-          <p:nvPr/>
-        </p:nvSpPr>
-        <p:spPr>
-          <a:xfrm>
-            <a:off x="6113235" y="2911088"/>
-            <a:ext cx="649515" cy="897126"/>
-          </a:xfrm>
-          <a:prstGeom prst="rect">
-            <a:avLst/>
-          </a:prstGeom>
-          <a:noFill/>
-          <a:ln w="9525">
-            <a:solidFill>
-              <a:schemeClr val="tx1"/>
-            </a:solidFill>
-          </a:ln>
-        </p:spPr>
-        <p:style>
-          <a:lnRef idx="2">
-            <a:schemeClr val="accent1">
-              <a:shade val="50000"/>
-            </a:schemeClr>
-          </a:lnRef>
-          <a:fillRef idx="1">
-            <a:schemeClr val="accent1"/>
-          </a:fillRef>
-          <a:effectRef idx="0">
-            <a:schemeClr val="accent1"/>
-          </a:effectRef>
-          <a:fontRef idx="minor">
-            <a:schemeClr val="lt1"/>
-          </a:fontRef>
-        </p:style>
-        <p:txBody>
-          <a:bodyPr rtlCol="0" anchor="ctr"/>
-          <a:lstStyle/>
-          <a:p>
-            <a:pPr algn="ctr"/>
-            <a:endParaRPr lang="en-GB"/>
-          </a:p>
-        </p:txBody>
-      </p:sp>
-      <p:sp>
-        <p:nvSpPr>
-          <p:cNvPr id="50" name="Rechteck 49"/>
-          <p:cNvSpPr/>
-          <p:nvPr/>
-        </p:nvSpPr>
-        <p:spPr>
-          <a:xfrm>
-            <a:off x="4373202" y="699732"/>
-            <a:ext cx="744765" cy="897126"/>
-          </a:xfrm>
-          <a:prstGeom prst="rect">
-            <a:avLst/>
-          </a:prstGeom>
-          <a:noFill/>
-          <a:ln w="9525">
-            <a:solidFill>
-              <a:schemeClr val="tx1"/>
-            </a:solidFill>
-          </a:ln>
-        </p:spPr>
-        <p:style>
-          <a:lnRef idx="2">
-            <a:schemeClr val="accent1">
-              <a:shade val="50000"/>
-            </a:schemeClr>
-          </a:lnRef>
-          <a:fillRef idx="1">
-            <a:schemeClr val="accent1"/>
-          </a:fillRef>
-          <a:effectRef idx="0">
-            <a:schemeClr val="accent1"/>
-          </a:effectRef>
-          <a:fontRef idx="minor">
-            <a:schemeClr val="lt1"/>
-          </a:fontRef>
-        </p:style>
-        <p:txBody>
-          <a:bodyPr rtlCol="0" anchor="ctr"/>
-          <a:lstStyle/>
-          <a:p>
-            <a:pPr algn="ctr"/>
-            <a:endParaRPr lang="en-GB"/>
-          </a:p>
-        </p:txBody>
-      </p:sp>
-      <p:sp>
-        <p:nvSpPr>
-          <p:cNvPr id="51" name="Rechteck 50"/>
-          <p:cNvSpPr/>
-          <p:nvPr/>
-        </p:nvSpPr>
-        <p:spPr>
-          <a:xfrm>
-            <a:off x="4373202" y="5197088"/>
-            <a:ext cx="744765" cy="897126"/>
-          </a:xfrm>
-          <a:prstGeom prst="rect">
-            <a:avLst/>
-          </a:prstGeom>
-          <a:noFill/>
-          <a:ln w="9525">
-            <a:solidFill>
-              <a:schemeClr val="tx1"/>
-            </a:solidFill>
-          </a:ln>
-        </p:spPr>
-        <p:style>
-          <a:lnRef idx="2">
-            <a:schemeClr val="accent1">
-              <a:shade val="50000"/>
-            </a:schemeClr>
-          </a:lnRef>
-          <a:fillRef idx="1">
-            <a:schemeClr val="accent1"/>
-          </a:fillRef>
-          <a:effectRef idx="0">
-            <a:schemeClr val="accent1"/>
-          </a:effectRef>
-          <a:fontRef idx="minor">
-            <a:schemeClr val="lt1"/>
-          </a:fontRef>
-        </p:style>
-        <p:txBody>
-          <a:bodyPr rtlCol="0" anchor="ctr"/>
-          <a:lstStyle/>
-          <a:p>
-            <a:pPr algn="ctr"/>
-            <a:endParaRPr lang="en-GB"/>
-          </a:p>
-        </p:txBody>
-      </p:sp>
-      <p:sp>
-        <p:nvSpPr>
-          <p:cNvPr id="52" name="Rechteck 51"/>
-          <p:cNvSpPr/>
-          <p:nvPr/>
-        </p:nvSpPr>
-        <p:spPr>
-          <a:xfrm>
-            <a:off x="2262869" y="5181805"/>
-            <a:ext cx="649515" cy="897126"/>
-          </a:xfrm>
-          <a:prstGeom prst="rect">
-            <a:avLst/>
-          </a:prstGeom>
-          <a:noFill/>
-          <a:ln w="9525">
-            <a:solidFill>
-              <a:schemeClr val="tx1"/>
-            </a:solidFill>
-          </a:ln>
-        </p:spPr>
-        <p:style>
-          <a:lnRef idx="2">
-            <a:schemeClr val="accent1">
-              <a:shade val="50000"/>
-            </a:schemeClr>
-          </a:lnRef>
-          <a:fillRef idx="1">
-            <a:schemeClr val="accent1"/>
-          </a:fillRef>
-          <a:effectRef idx="0">
-            <a:schemeClr val="accent1"/>
-          </a:effectRef>
-          <a:fontRef idx="minor">
-            <a:schemeClr val="lt1"/>
-          </a:fontRef>
-        </p:style>
-        <p:txBody>
-          <a:bodyPr rtlCol="0" anchor="ctr"/>
-          <a:lstStyle/>
-          <a:p>
-            <a:pPr algn="ctr"/>
-            <a:endParaRPr lang="en-GB"/>
-          </a:p>
-        </p:txBody>
-      </p:sp>
-      <p:cxnSp>
-        <p:nvCxnSpPr>
-          <p:cNvPr id="54" name="Gerader Verbinder 53"/>
-          <p:cNvCxnSpPr/>
-          <p:nvPr/>
-        </p:nvCxnSpPr>
-        <p:spPr>
-          <a:xfrm flipH="1">
-            <a:off x="4927601" y="1596858"/>
-            <a:ext cx="190366" cy="616117"/>
-          </a:xfrm>
-          <a:prstGeom prst="line">
-            <a:avLst/>
-          </a:prstGeom>
-          <a:ln w="9525">
-            <a:solidFill>
-              <a:schemeClr val="tx1"/>
-            </a:solidFill>
-          </a:ln>
-        </p:spPr>
-        <p:style>
-          <a:lnRef idx="1">
-            <a:schemeClr val="accent1"/>
-          </a:lnRef>
-          <a:fillRef idx="0">
-            <a:schemeClr val="accent1"/>
-          </a:fillRef>
-          <a:effectRef idx="0">
-            <a:schemeClr val="accent1"/>
-          </a:effectRef>
-          <a:fontRef idx="minor">
-            <a:schemeClr val="tx1"/>
-          </a:fontRef>
-        </p:style>
-      </p:cxnSp>
-      <p:cxnSp>
-        <p:nvCxnSpPr>
-          <p:cNvPr id="55" name="Gerader Verbinder 54"/>
-          <p:cNvCxnSpPr/>
-          <p:nvPr/>
-        </p:nvCxnSpPr>
-        <p:spPr>
-          <a:xfrm>
-            <a:off x="4372938" y="1596858"/>
-            <a:ext cx="202237" cy="616117"/>
-          </a:xfrm>
-          <a:prstGeom prst="line">
-            <a:avLst/>
-          </a:prstGeom>
-          <a:ln w="9525">
-            <a:solidFill>
-              <a:schemeClr val="tx1"/>
-            </a:solidFill>
-          </a:ln>
-        </p:spPr>
-        <p:style>
-          <a:lnRef idx="1">
-            <a:schemeClr val="accent1"/>
-          </a:lnRef>
-          <a:fillRef idx="0">
-            <a:schemeClr val="accent1"/>
-          </a:fillRef>
-          <a:effectRef idx="0">
-            <a:schemeClr val="accent1"/>
-          </a:effectRef>
-          <a:fontRef idx="minor">
-            <a:schemeClr val="tx1"/>
-          </a:fontRef>
-        </p:style>
-      </p:cxnSp>
       <p:cxnSp>
         <p:nvCxnSpPr>
           <p:cNvPr id="60" name="Gerader Verbinder 59"/>
@@ -3632,8 +3069,8 @@
         </p:nvCxnSpPr>
         <p:spPr>
           <a:xfrm flipH="1">
-            <a:off x="4927601" y="3807756"/>
-            <a:ext cx="190366" cy="616117"/>
+            <a:off x="4806065" y="3805831"/>
+            <a:ext cx="169286" cy="618042"/>
           </a:xfrm>
           <a:prstGeom prst="line">
             <a:avLst/>
@@ -3667,8 +3104,8 @@
         </p:nvCxnSpPr>
         <p:spPr>
           <a:xfrm>
-            <a:off x="4372938" y="3807756"/>
-            <a:ext cx="202237" cy="616117"/>
+            <a:off x="4487207" y="3807410"/>
+            <a:ext cx="203683" cy="616484"/>
           </a:xfrm>
           <a:prstGeom prst="line">
             <a:avLst/>
@@ -3702,8 +3139,8 @@
         </p:nvCxnSpPr>
         <p:spPr>
           <a:xfrm flipH="1">
-            <a:off x="4927601" y="6094214"/>
-            <a:ext cx="190366" cy="600834"/>
+            <a:off x="4917670" y="6078931"/>
+            <a:ext cx="207158" cy="602760"/>
           </a:xfrm>
           <a:prstGeom prst="line">
             <a:avLst/>
@@ -3737,8 +3174,8 @@
         </p:nvCxnSpPr>
         <p:spPr>
           <a:xfrm>
-            <a:off x="4370192" y="6094214"/>
-            <a:ext cx="204983" cy="600834"/>
+            <a:off x="4580997" y="6078931"/>
+            <a:ext cx="227480" cy="606207"/>
           </a:xfrm>
           <a:prstGeom prst="line">
             <a:avLst/>
@@ -3773,7 +3210,7 @@
         <p:spPr>
           <a:xfrm flipH="1">
             <a:off x="2658200" y="6078931"/>
-            <a:ext cx="251174" cy="616117"/>
+            <a:ext cx="221290" cy="603417"/>
           </a:xfrm>
           <a:prstGeom prst="line">
             <a:avLst/>
@@ -3807,8 +3244,8 @@
         </p:nvCxnSpPr>
         <p:spPr>
           <a:xfrm>
-            <a:off x="2262605" y="6078931"/>
-            <a:ext cx="294343" cy="616117"/>
+            <a:off x="2335395" y="6078931"/>
+            <a:ext cx="217040" cy="602760"/>
           </a:xfrm>
           <a:prstGeom prst="line">
             <a:avLst/>
@@ -3842,8 +3279,8 @@
         </p:nvCxnSpPr>
         <p:spPr>
           <a:xfrm flipH="1">
-            <a:off x="3959203" y="3811546"/>
-            <a:ext cx="264190" cy="612327"/>
+            <a:off x="3959203" y="3808214"/>
+            <a:ext cx="202446" cy="615659"/>
           </a:xfrm>
           <a:prstGeom prst="line">
             <a:avLst/>
@@ -3877,8 +3314,939 @@
         </p:nvCxnSpPr>
         <p:spPr>
           <a:xfrm>
-            <a:off x="3587529" y="3811546"/>
-            <a:ext cx="267715" cy="612327"/>
+            <a:off x="3675243" y="3807410"/>
+            <a:ext cx="180001" cy="616463"/>
+          </a:xfrm>
+          <a:prstGeom prst="line">
+            <a:avLst/>
+          </a:prstGeom>
+          <a:ln w="9525">
+            <a:solidFill>
+              <a:schemeClr val="tx1"/>
+            </a:solidFill>
+          </a:ln>
+        </p:spPr>
+        <p:style>
+          <a:lnRef idx="1">
+            <a:schemeClr val="accent1"/>
+          </a:lnRef>
+          <a:fillRef idx="0">
+            <a:schemeClr val="accent1"/>
+          </a:fillRef>
+          <a:effectRef idx="0">
+            <a:schemeClr val="accent1"/>
+          </a:effectRef>
+          <a:fontRef idx="minor">
+            <a:schemeClr val="tx1"/>
+          </a:fontRef>
+        </p:style>
+      </p:cxnSp>
+      <p:grpSp>
+        <p:nvGrpSpPr>
+          <p:cNvPr id="7" name="Gruppieren 6"/>
+          <p:cNvGrpSpPr/>
+          <p:nvPr/>
+        </p:nvGrpSpPr>
+        <p:grpSpPr>
+          <a:xfrm>
+            <a:off x="4600204" y="699193"/>
+            <a:ext cx="507832" cy="960001"/>
+            <a:chOff x="4398231" y="699731"/>
+            <a:chExt cx="507832" cy="960001"/>
+          </a:xfrm>
+        </p:grpSpPr>
+        <p:pic>
+          <p:nvPicPr>
+            <p:cNvPr id="41" name="Grafik 40"/>
+            <p:cNvPicPr>
+              <a:picLocks noChangeAspect="1"/>
+            </p:cNvPicPr>
+            <p:nvPr/>
+          </p:nvPicPr>
+          <p:blipFill rotWithShape="1">
+            <a:blip r:embed="rId5" cstate="print">
+              <a:extLst>
+                <a:ext uri="{28A0092B-C50C-407E-A947-70E740481C1C}">
+                  <a14:useLocalDpi xmlns:a14="http://schemas.microsoft.com/office/drawing/2010/main" val="0"/>
+                </a:ext>
+              </a:extLst>
+            </a:blip>
+            <a:srcRect l="-1" r="53046"/>
+            <a:stretch/>
+          </p:blipFill>
+          <p:spPr>
+            <a:xfrm>
+              <a:off x="4398231" y="699732"/>
+              <a:ext cx="338075" cy="960000"/>
+            </a:xfrm>
+            <a:prstGeom prst="rect">
+              <a:avLst/>
+            </a:prstGeom>
+          </p:spPr>
+        </p:pic>
+        <p:sp>
+          <p:nvSpPr>
+            <p:cNvPr id="50" name="Rechteck 49"/>
+            <p:cNvSpPr/>
+            <p:nvPr/>
+          </p:nvSpPr>
+          <p:spPr>
+            <a:xfrm>
+              <a:off x="4398231" y="699731"/>
+              <a:ext cx="507832" cy="898405"/>
+            </a:xfrm>
+            <a:prstGeom prst="rect">
+              <a:avLst/>
+            </a:prstGeom>
+            <a:noFill/>
+            <a:ln w="9525">
+              <a:solidFill>
+                <a:schemeClr val="tx1"/>
+              </a:solidFill>
+            </a:ln>
+          </p:spPr>
+          <p:style>
+            <a:lnRef idx="2">
+              <a:schemeClr val="accent1">
+                <a:shade val="50000"/>
+              </a:schemeClr>
+            </a:lnRef>
+            <a:fillRef idx="1">
+              <a:schemeClr val="accent1"/>
+            </a:fillRef>
+            <a:effectRef idx="0">
+              <a:schemeClr val="accent1"/>
+            </a:effectRef>
+            <a:fontRef idx="minor">
+              <a:schemeClr val="lt1"/>
+            </a:fontRef>
+          </p:style>
+          <p:txBody>
+            <a:bodyPr rtlCol="0" anchor="ctr"/>
+            <a:lstStyle/>
+            <a:p>
+              <a:pPr algn="ctr"/>
+              <a:endParaRPr lang="en-GB"/>
+            </a:p>
+          </p:txBody>
+        </p:sp>
+        <p:pic>
+          <p:nvPicPr>
+            <p:cNvPr id="31" name="Grafik 30"/>
+            <p:cNvPicPr>
+              <a:picLocks noChangeAspect="1"/>
+            </p:cNvPicPr>
+            <p:nvPr/>
+          </p:nvPicPr>
+          <p:blipFill rotWithShape="1">
+            <a:blip r:embed="rId5" cstate="print">
+              <a:extLst>
+                <a:ext uri="{28A0092B-C50C-407E-A947-70E740481C1C}">
+                  <a14:useLocalDpi xmlns:a14="http://schemas.microsoft.com/office/drawing/2010/main" val="0"/>
+                </a:ext>
+              </a:extLst>
+            </a:blip>
+            <a:srcRect l="63822" t="2642" b="34656"/>
+            <a:stretch/>
+          </p:blipFill>
+          <p:spPr>
+            <a:xfrm>
+              <a:off x="4615343" y="723900"/>
+              <a:ext cx="260481" cy="601940"/>
+            </a:xfrm>
+            <a:prstGeom prst="rect">
+              <a:avLst/>
+            </a:prstGeom>
+          </p:spPr>
+        </p:pic>
+        <p:sp>
+          <p:nvSpPr>
+            <p:cNvPr id="2" name="Rechteck 1"/>
+            <p:cNvSpPr/>
+            <p:nvPr/>
+          </p:nvSpPr>
+          <p:spPr>
+            <a:xfrm>
+              <a:off x="4757739" y="1325839"/>
+              <a:ext cx="118086" cy="240313"/>
+            </a:xfrm>
+            <a:prstGeom prst="rect">
+              <a:avLst/>
+            </a:prstGeom>
+            <a:solidFill>
+              <a:schemeClr val="bg1"/>
+            </a:solidFill>
+            <a:ln>
+              <a:solidFill>
+                <a:schemeClr val="bg1"/>
+              </a:solidFill>
+            </a:ln>
+          </p:spPr>
+          <p:style>
+            <a:lnRef idx="2">
+              <a:schemeClr val="accent1">
+                <a:shade val="50000"/>
+              </a:schemeClr>
+            </a:lnRef>
+            <a:fillRef idx="1">
+              <a:schemeClr val="accent1"/>
+            </a:fillRef>
+            <a:effectRef idx="0">
+              <a:schemeClr val="accent1"/>
+            </a:effectRef>
+            <a:fontRef idx="minor">
+              <a:schemeClr val="lt1"/>
+            </a:fontRef>
+          </p:style>
+          <p:txBody>
+            <a:bodyPr rtlCol="0" anchor="ctr"/>
+            <a:lstStyle/>
+            <a:p>
+              <a:pPr algn="ctr"/>
+              <a:endParaRPr lang="en-GB"/>
+            </a:p>
+          </p:txBody>
+        </p:sp>
+        <p:pic>
+          <p:nvPicPr>
+            <p:cNvPr id="32" name="Grafik 31"/>
+            <p:cNvPicPr>
+              <a:picLocks noChangeAspect="1"/>
+            </p:cNvPicPr>
+            <p:nvPr/>
+          </p:nvPicPr>
+          <p:blipFill rotWithShape="1">
+            <a:blip r:embed="rId5" cstate="print">
+              <a:extLst>
+                <a:ext uri="{28A0092B-C50C-407E-A947-70E740481C1C}">
+                  <a14:useLocalDpi xmlns:a14="http://schemas.microsoft.com/office/drawing/2010/main" val="0"/>
+                </a:ext>
+              </a:extLst>
+            </a:blip>
+            <a:srcRect l="57066" t="70062" r="12175" b="7614"/>
+            <a:stretch/>
+          </p:blipFill>
+          <p:spPr>
+            <a:xfrm>
+              <a:off x="4559548" y="1353382"/>
+              <a:ext cx="245327" cy="237415"/>
+            </a:xfrm>
+            <a:prstGeom prst="rect">
+              <a:avLst/>
+            </a:prstGeom>
+          </p:spPr>
+        </p:pic>
+      </p:grpSp>
+      <p:cxnSp>
+        <p:nvCxnSpPr>
+          <p:cNvPr id="54" name="Gerader Verbinder 53"/>
+          <p:cNvCxnSpPr/>
+          <p:nvPr/>
+        </p:nvCxnSpPr>
+        <p:spPr>
+          <a:xfrm flipH="1">
+            <a:off x="4917670" y="1597598"/>
+            <a:ext cx="190366" cy="605899"/>
+          </a:xfrm>
+          <a:prstGeom prst="line">
+            <a:avLst/>
+          </a:prstGeom>
+          <a:ln w="9525">
+            <a:solidFill>
+              <a:schemeClr val="tx1"/>
+            </a:solidFill>
+          </a:ln>
+        </p:spPr>
+        <p:style>
+          <a:lnRef idx="1">
+            <a:schemeClr val="accent1"/>
+          </a:lnRef>
+          <a:fillRef idx="0">
+            <a:schemeClr val="accent1"/>
+          </a:fillRef>
+          <a:effectRef idx="0">
+            <a:schemeClr val="accent1"/>
+          </a:effectRef>
+          <a:fontRef idx="minor">
+            <a:schemeClr val="tx1"/>
+          </a:fontRef>
+        </p:style>
+      </p:cxnSp>
+      <p:cxnSp>
+        <p:nvCxnSpPr>
+          <p:cNvPr id="55" name="Gerader Verbinder 54"/>
+          <p:cNvCxnSpPr/>
+          <p:nvPr/>
+        </p:nvCxnSpPr>
+        <p:spPr>
+          <a:xfrm>
+            <a:off x="4600204" y="1597598"/>
+            <a:ext cx="205861" cy="605900"/>
+          </a:xfrm>
+          <a:prstGeom prst="line">
+            <a:avLst/>
+          </a:prstGeom>
+          <a:ln w="9525">
+            <a:solidFill>
+              <a:schemeClr val="tx1"/>
+            </a:solidFill>
+          </a:ln>
+        </p:spPr>
+        <p:style>
+          <a:lnRef idx="1">
+            <a:schemeClr val="accent1"/>
+          </a:lnRef>
+          <a:fillRef idx="0">
+            <a:schemeClr val="accent1"/>
+          </a:fillRef>
+          <a:effectRef idx="0">
+            <a:schemeClr val="accent1"/>
+          </a:effectRef>
+          <a:fontRef idx="minor">
+            <a:schemeClr val="tx1"/>
+          </a:fontRef>
+        </p:style>
+      </p:cxnSp>
+      <p:grpSp>
+        <p:nvGrpSpPr>
+          <p:cNvPr id="10" name="Gruppieren 9"/>
+          <p:cNvGrpSpPr/>
+          <p:nvPr/>
+        </p:nvGrpSpPr>
+        <p:grpSpPr>
+          <a:xfrm>
+            <a:off x="3677578" y="2908707"/>
+            <a:ext cx="608736" cy="910581"/>
+            <a:chOff x="3590933" y="2914420"/>
+            <a:chExt cx="608736" cy="910581"/>
+          </a:xfrm>
+        </p:grpSpPr>
+        <p:pic>
+          <p:nvPicPr>
+            <p:cNvPr id="42" name="Grafik 41"/>
+            <p:cNvPicPr>
+              <a:picLocks noChangeAspect="1"/>
+            </p:cNvPicPr>
+            <p:nvPr/>
+          </p:nvPicPr>
+          <p:blipFill rotWithShape="1">
+            <a:blip r:embed="rId6" cstate="print">
+              <a:extLst>
+                <a:ext uri="{28A0092B-C50C-407E-A947-70E740481C1C}">
+                  <a14:useLocalDpi xmlns:a14="http://schemas.microsoft.com/office/drawing/2010/main" val="0"/>
+                </a:ext>
+              </a:extLst>
+            </a:blip>
+            <a:srcRect r="37824" b="30523"/>
+            <a:stretch/>
+          </p:blipFill>
+          <p:spPr>
+            <a:xfrm>
+              <a:off x="3590933" y="2947759"/>
+              <a:ext cx="447667" cy="666980"/>
+            </a:xfrm>
+            <a:prstGeom prst="rect">
+              <a:avLst/>
+            </a:prstGeom>
+          </p:spPr>
+        </p:pic>
+        <p:pic>
+          <p:nvPicPr>
+            <p:cNvPr id="53" name="Grafik 52"/>
+            <p:cNvPicPr>
+              <a:picLocks noChangeAspect="1"/>
+            </p:cNvPicPr>
+            <p:nvPr/>
+          </p:nvPicPr>
+          <p:blipFill rotWithShape="1">
+            <a:blip r:embed="rId6" cstate="print">
+              <a:extLst>
+                <a:ext uri="{28A0092B-C50C-407E-A947-70E740481C1C}">
+                  <a14:useLocalDpi xmlns:a14="http://schemas.microsoft.com/office/drawing/2010/main" val="0"/>
+                </a:ext>
+              </a:extLst>
+            </a:blip>
+            <a:srcRect l="39522" t="68483" r="32035" b="8696"/>
+            <a:stretch/>
+          </p:blipFill>
+          <p:spPr>
+            <a:xfrm>
+              <a:off x="3767449" y="3605926"/>
+              <a:ext cx="204787" cy="219075"/>
+            </a:xfrm>
+            <a:prstGeom prst="rect">
+              <a:avLst/>
+            </a:prstGeom>
+          </p:spPr>
+        </p:pic>
+        <p:pic>
+          <p:nvPicPr>
+            <p:cNvPr id="40" name="Grafik 39"/>
+            <p:cNvPicPr>
+              <a:picLocks noChangeAspect="1"/>
+            </p:cNvPicPr>
+            <p:nvPr/>
+          </p:nvPicPr>
+          <p:blipFill rotWithShape="1">
+            <a:blip r:embed="rId6" cstate="print">
+              <a:extLst>
+                <a:ext uri="{28A0092B-C50C-407E-A947-70E740481C1C}">
+                  <a14:useLocalDpi xmlns:a14="http://schemas.microsoft.com/office/drawing/2010/main" val="0"/>
+                </a:ext>
+              </a:extLst>
+            </a:blip>
+            <a:srcRect l="46541" b="31073"/>
+            <a:stretch/>
+          </p:blipFill>
+          <p:spPr>
+            <a:xfrm>
+              <a:off x="3814766" y="2952547"/>
+              <a:ext cx="384903" cy="661696"/>
+            </a:xfrm>
+            <a:prstGeom prst="rect">
+              <a:avLst/>
+            </a:prstGeom>
+          </p:spPr>
+        </p:pic>
+        <p:sp>
+          <p:nvSpPr>
+            <p:cNvPr id="47" name="Rechteck 46"/>
+            <p:cNvSpPr/>
+            <p:nvPr/>
+          </p:nvSpPr>
+          <p:spPr>
+            <a:xfrm>
+              <a:off x="3590933" y="2914420"/>
+              <a:ext cx="488144" cy="897126"/>
+            </a:xfrm>
+            <a:prstGeom prst="rect">
+              <a:avLst/>
+            </a:prstGeom>
+            <a:noFill/>
+            <a:ln w="9525">
+              <a:solidFill>
+                <a:schemeClr val="tx1"/>
+              </a:solidFill>
+            </a:ln>
+          </p:spPr>
+          <p:style>
+            <a:lnRef idx="2">
+              <a:schemeClr val="accent1">
+                <a:shade val="50000"/>
+              </a:schemeClr>
+            </a:lnRef>
+            <a:fillRef idx="1">
+              <a:schemeClr val="accent1"/>
+            </a:fillRef>
+            <a:effectRef idx="0">
+              <a:schemeClr val="accent1"/>
+            </a:effectRef>
+            <a:fontRef idx="minor">
+              <a:schemeClr val="lt1"/>
+            </a:fontRef>
+          </p:style>
+          <p:txBody>
+            <a:bodyPr rtlCol="0" anchor="ctr"/>
+            <a:lstStyle/>
+            <a:p>
+              <a:pPr algn="ctr"/>
+              <a:endParaRPr lang="en-GB"/>
+            </a:p>
+          </p:txBody>
+        </p:sp>
+      </p:grpSp>
+      <p:sp>
+        <p:nvSpPr>
+          <p:cNvPr id="57" name="Rechteck 56"/>
+          <p:cNvSpPr/>
+          <p:nvPr/>
+        </p:nvSpPr>
+        <p:spPr>
+          <a:xfrm>
+            <a:off x="2864047" y="2937967"/>
+            <a:ext cx="118086" cy="51015"/>
+          </a:xfrm>
+          <a:prstGeom prst="rect">
+            <a:avLst/>
+          </a:prstGeom>
+          <a:solidFill>
+            <a:schemeClr val="bg1"/>
+          </a:solidFill>
+          <a:ln>
+            <a:solidFill>
+              <a:schemeClr val="bg1"/>
+            </a:solidFill>
+          </a:ln>
+        </p:spPr>
+        <p:style>
+          <a:lnRef idx="2">
+            <a:schemeClr val="accent1">
+              <a:shade val="50000"/>
+            </a:schemeClr>
+          </a:lnRef>
+          <a:fillRef idx="1">
+            <a:schemeClr val="accent1"/>
+          </a:fillRef>
+          <a:effectRef idx="0">
+            <a:schemeClr val="accent1"/>
+          </a:effectRef>
+          <a:fontRef idx="minor">
+            <a:schemeClr val="lt1"/>
+          </a:fontRef>
+        </p:style>
+        <p:txBody>
+          <a:bodyPr rtlCol="0" anchor="ctr"/>
+          <a:lstStyle/>
+          <a:p>
+            <a:pPr algn="ctr"/>
+            <a:endParaRPr lang="en-GB"/>
+          </a:p>
+        </p:txBody>
+      </p:sp>
+      <p:grpSp>
+        <p:nvGrpSpPr>
+          <p:cNvPr id="19" name="Gruppieren 18"/>
+          <p:cNvGrpSpPr/>
+          <p:nvPr/>
+        </p:nvGrpSpPr>
+        <p:grpSpPr>
+          <a:xfrm>
+            <a:off x="4499903" y="2934003"/>
+            <a:ext cx="456657" cy="859695"/>
+            <a:chOff x="2768669" y="2910788"/>
+            <a:chExt cx="456657" cy="859695"/>
+          </a:xfrm>
+        </p:grpSpPr>
+        <p:grpSp>
+          <p:nvGrpSpPr>
+            <p:cNvPr id="18" name="Gruppieren 17"/>
+            <p:cNvGrpSpPr/>
+            <p:nvPr/>
+          </p:nvGrpSpPr>
+          <p:grpSpPr>
+            <a:xfrm>
+              <a:off x="2768669" y="2910788"/>
+              <a:ext cx="456657" cy="859695"/>
+              <a:chOff x="2783787" y="2911088"/>
+              <a:chExt cx="456657" cy="859695"/>
+            </a:xfrm>
+          </p:grpSpPr>
+          <p:pic>
+            <p:nvPicPr>
+              <p:cNvPr id="56" name="Grafik 55"/>
+              <p:cNvPicPr>
+                <a:picLocks noChangeAspect="1"/>
+              </p:cNvPicPr>
+              <p:nvPr/>
+            </p:nvPicPr>
+            <p:blipFill rotWithShape="1">
+              <a:blip r:embed="rId7" cstate="print">
+                <a:extLst>
+                  <a:ext uri="{28A0092B-C50C-407E-A947-70E740481C1C}">
+                    <a14:useLocalDpi xmlns:a14="http://schemas.microsoft.com/office/drawing/2010/main" val="0"/>
+                  </a:ext>
+                </a:extLst>
+              </a:blip>
+              <a:srcRect r="72283" b="31466"/>
+              <a:stretch/>
+            </p:blipFill>
+            <p:spPr>
+              <a:xfrm>
+                <a:off x="2783787" y="2911088"/>
+                <a:ext cx="199564" cy="657930"/>
+              </a:xfrm>
+              <a:prstGeom prst="rect">
+                <a:avLst/>
+              </a:prstGeom>
+            </p:spPr>
+          </p:pic>
+          <p:grpSp>
+            <p:nvGrpSpPr>
+              <p:cNvPr id="17" name="Gruppieren 16"/>
+              <p:cNvGrpSpPr/>
+              <p:nvPr/>
+            </p:nvGrpSpPr>
+            <p:grpSpPr>
+              <a:xfrm>
+                <a:off x="2991554" y="2913469"/>
+                <a:ext cx="248890" cy="668735"/>
+                <a:chOff x="3250823" y="2916702"/>
+                <a:chExt cx="248890" cy="668735"/>
+              </a:xfrm>
+            </p:grpSpPr>
+            <p:pic>
+              <p:nvPicPr>
+                <p:cNvPr id="59" name="Grafik 58"/>
+                <p:cNvPicPr>
+                  <a:picLocks noChangeAspect="1"/>
+                </p:cNvPicPr>
+                <p:nvPr/>
+              </p:nvPicPr>
+              <p:blipFill rotWithShape="1">
+                <a:blip r:embed="rId7" cstate="print">
+                  <a:extLst>
+                    <a:ext uri="{28A0092B-C50C-407E-A947-70E740481C1C}">
+                      <a14:useLocalDpi xmlns:a14="http://schemas.microsoft.com/office/drawing/2010/main" val="0"/>
+                    </a:ext>
+                  </a:extLst>
+                </a:blip>
+                <a:srcRect l="27173" r="38793" b="30340"/>
+                <a:stretch/>
+              </p:blipFill>
+              <p:spPr>
+                <a:xfrm>
+                  <a:off x="3254662" y="2916702"/>
+                  <a:ext cx="245051" cy="668735"/>
+                </a:xfrm>
+                <a:prstGeom prst="rect">
+                  <a:avLst/>
+                </a:prstGeom>
+              </p:spPr>
+            </p:pic>
+            <p:pic>
+              <p:nvPicPr>
+                <p:cNvPr id="66" name="Grafik 65"/>
+                <p:cNvPicPr>
+                  <a:picLocks noChangeAspect="1"/>
+                </p:cNvPicPr>
+                <p:nvPr/>
+              </p:nvPicPr>
+              <p:blipFill rotWithShape="1">
+                <a:blip r:embed="rId7" cstate="print">
+                  <a:extLst>
+                    <a:ext uri="{28A0092B-C50C-407E-A947-70E740481C1C}">
+                      <a14:useLocalDpi xmlns:a14="http://schemas.microsoft.com/office/drawing/2010/main" val="0"/>
+                    </a:ext>
+                  </a:extLst>
+                </a:blip>
+                <a:srcRect l="42543" t="6185" r="51107" b="42964"/>
+                <a:stretch/>
+              </p:blipFill>
+              <p:spPr>
+                <a:xfrm>
+                  <a:off x="3251063" y="2959306"/>
+                  <a:ext cx="45719" cy="488156"/>
+                </a:xfrm>
+                <a:prstGeom prst="rect">
+                  <a:avLst/>
+                </a:prstGeom>
+              </p:spPr>
+            </p:pic>
+            <p:pic>
+              <p:nvPicPr>
+                <p:cNvPr id="67" name="Grafik 66"/>
+                <p:cNvPicPr>
+                  <a:picLocks noChangeAspect="1"/>
+                </p:cNvPicPr>
+                <p:nvPr/>
+              </p:nvPicPr>
+              <p:blipFill rotWithShape="1">
+                <a:blip r:embed="rId7" cstate="print">
+                  <a:extLst>
+                    <a:ext uri="{28A0092B-C50C-407E-A947-70E740481C1C}">
+                      <a14:useLocalDpi xmlns:a14="http://schemas.microsoft.com/office/drawing/2010/main" val="0"/>
+                    </a:ext>
+                  </a:extLst>
+                </a:blip>
+                <a:srcRect l="42543" t="6185" r="51107" b="42964"/>
+                <a:stretch/>
+              </p:blipFill>
+              <p:spPr>
+                <a:xfrm>
+                  <a:off x="3250823" y="3047217"/>
+                  <a:ext cx="45719" cy="488156"/>
+                </a:xfrm>
+                <a:prstGeom prst="rect">
+                  <a:avLst/>
+                </a:prstGeom>
+              </p:spPr>
+            </p:pic>
+          </p:grpSp>
+          <p:sp>
+            <p:nvSpPr>
+              <p:cNvPr id="68" name="Rechteck 67"/>
+              <p:cNvSpPr/>
+              <p:nvPr/>
+            </p:nvSpPr>
+            <p:spPr>
+              <a:xfrm>
+                <a:off x="3119977" y="3548346"/>
+                <a:ext cx="118086" cy="51015"/>
+              </a:xfrm>
+              <a:prstGeom prst="rect">
+                <a:avLst/>
+              </a:prstGeom>
+              <a:solidFill>
+                <a:schemeClr val="bg1"/>
+              </a:solidFill>
+              <a:ln>
+                <a:solidFill>
+                  <a:schemeClr val="bg1"/>
+                </a:solidFill>
+              </a:ln>
+            </p:spPr>
+            <p:style>
+              <a:lnRef idx="2">
+                <a:schemeClr val="accent1">
+                  <a:shade val="50000"/>
+                </a:schemeClr>
+              </a:lnRef>
+              <a:fillRef idx="1">
+                <a:schemeClr val="accent1"/>
+              </a:fillRef>
+              <a:effectRef idx="0">
+                <a:schemeClr val="accent1"/>
+              </a:effectRef>
+              <a:fontRef idx="minor">
+                <a:schemeClr val="lt1"/>
+              </a:fontRef>
+            </p:style>
+            <p:txBody>
+              <a:bodyPr rtlCol="0" anchor="ctr"/>
+              <a:lstStyle/>
+              <a:p>
+                <a:pPr algn="ctr"/>
+                <a:endParaRPr lang="en-GB"/>
+              </a:p>
+            </p:txBody>
+          </p:sp>
+          <p:pic>
+            <p:nvPicPr>
+              <p:cNvPr id="69" name="Grafik 68"/>
+              <p:cNvPicPr>
+                <a:picLocks noChangeAspect="1"/>
+              </p:cNvPicPr>
+              <p:nvPr/>
+            </p:nvPicPr>
+            <p:blipFill rotWithShape="1">
+              <a:blip r:embed="rId7" cstate="print">
+                <a:extLst>
+                  <a:ext uri="{28A0092B-C50C-407E-A947-70E740481C1C}">
+                    <a14:useLocalDpi xmlns:a14="http://schemas.microsoft.com/office/drawing/2010/main" val="0"/>
+                  </a:ext>
+                </a:extLst>
+              </a:blip>
+              <a:srcRect l="18486" t="69468" r="52410" b="10192"/>
+              <a:stretch/>
+            </p:blipFill>
+            <p:spPr>
+              <a:xfrm>
+                <a:off x="2929070" y="3575519"/>
+                <a:ext cx="209551" cy="195264"/>
+              </a:xfrm>
+              <a:prstGeom prst="rect">
+                <a:avLst/>
+              </a:prstGeom>
+            </p:spPr>
+          </p:pic>
+        </p:grpSp>
+        <p:sp>
+          <p:nvSpPr>
+            <p:cNvPr id="70" name="Rechteck 69"/>
+            <p:cNvSpPr/>
+            <p:nvPr/>
+          </p:nvSpPr>
+          <p:spPr>
+            <a:xfrm>
+              <a:off x="2852569" y="2936548"/>
+              <a:ext cx="118086" cy="51015"/>
+            </a:xfrm>
+            <a:prstGeom prst="rect">
+              <a:avLst/>
+            </a:prstGeom>
+            <a:solidFill>
+              <a:schemeClr val="bg1"/>
+            </a:solidFill>
+            <a:ln>
+              <a:solidFill>
+                <a:schemeClr val="bg1"/>
+              </a:solidFill>
+            </a:ln>
+          </p:spPr>
+          <p:style>
+            <a:lnRef idx="2">
+              <a:schemeClr val="accent1">
+                <a:shade val="50000"/>
+              </a:schemeClr>
+            </a:lnRef>
+            <a:fillRef idx="1">
+              <a:schemeClr val="accent1"/>
+            </a:fillRef>
+            <a:effectRef idx="0">
+              <a:schemeClr val="accent1"/>
+            </a:effectRef>
+            <a:fontRef idx="minor">
+              <a:schemeClr val="lt1"/>
+            </a:fontRef>
+          </p:style>
+          <p:txBody>
+            <a:bodyPr rtlCol="0" anchor="ctr"/>
+            <a:lstStyle/>
+            <a:p>
+              <a:pPr algn="ctr"/>
+              <a:endParaRPr lang="en-GB"/>
+            </a:p>
+          </p:txBody>
+        </p:sp>
+      </p:grpSp>
+      <p:sp>
+        <p:nvSpPr>
+          <p:cNvPr id="71" name="Rechteck 70"/>
+          <p:cNvSpPr/>
+          <p:nvPr/>
+        </p:nvSpPr>
+        <p:spPr>
+          <a:xfrm>
+            <a:off x="4487207" y="2908705"/>
+            <a:ext cx="488144" cy="897126"/>
+          </a:xfrm>
+          <a:prstGeom prst="rect">
+            <a:avLst/>
+          </a:prstGeom>
+          <a:noFill/>
+          <a:ln w="9525">
+            <a:solidFill>
+              <a:schemeClr val="tx1"/>
+            </a:solidFill>
+          </a:ln>
+        </p:spPr>
+        <p:style>
+          <a:lnRef idx="2">
+            <a:schemeClr val="accent1">
+              <a:shade val="50000"/>
+            </a:schemeClr>
+          </a:lnRef>
+          <a:fillRef idx="1">
+            <a:schemeClr val="accent1"/>
+          </a:fillRef>
+          <a:effectRef idx="0">
+            <a:schemeClr val="accent1"/>
+          </a:effectRef>
+          <a:fontRef idx="minor">
+            <a:schemeClr val="lt1"/>
+          </a:fontRef>
+        </p:style>
+        <p:txBody>
+          <a:bodyPr rtlCol="0" anchor="ctr"/>
+          <a:lstStyle/>
+          <a:p>
+            <a:pPr algn="ctr"/>
+            <a:endParaRPr lang="en-GB"/>
+          </a:p>
+        </p:txBody>
+      </p:sp>
+      <p:grpSp>
+        <p:nvGrpSpPr>
+          <p:cNvPr id="27" name="Gruppieren 26"/>
+          <p:cNvGrpSpPr/>
+          <p:nvPr/>
+        </p:nvGrpSpPr>
+        <p:grpSpPr>
+          <a:xfrm>
+            <a:off x="6387934" y="2947776"/>
+            <a:ext cx="452508" cy="961055"/>
+            <a:chOff x="6138000" y="2946703"/>
+            <a:chExt cx="452508" cy="961055"/>
+          </a:xfrm>
+        </p:grpSpPr>
+        <p:pic>
+          <p:nvPicPr>
+            <p:cNvPr id="43" name="Grafik 42"/>
+            <p:cNvPicPr>
+              <a:picLocks noChangeAspect="1"/>
+            </p:cNvPicPr>
+            <p:nvPr/>
+          </p:nvPicPr>
+          <p:blipFill rotWithShape="1">
+            <a:blip r:embed="rId8" cstate="print">
+              <a:extLst>
+                <a:ext uri="{28A0092B-C50C-407E-A947-70E740481C1C}">
+                  <a14:useLocalDpi xmlns:a14="http://schemas.microsoft.com/office/drawing/2010/main" val="0"/>
+                </a:ext>
+              </a:extLst>
+            </a:blip>
+            <a:srcRect r="70555"/>
+            <a:stretch/>
+          </p:blipFill>
+          <p:spPr>
+            <a:xfrm>
+              <a:off x="6138000" y="2947758"/>
+              <a:ext cx="212000" cy="960000"/>
+            </a:xfrm>
+            <a:prstGeom prst="rect">
+              <a:avLst/>
+            </a:prstGeom>
+          </p:spPr>
+        </p:pic>
+        <p:pic>
+          <p:nvPicPr>
+            <p:cNvPr id="72" name="Grafik 71"/>
+            <p:cNvPicPr>
+              <a:picLocks noChangeAspect="1"/>
+            </p:cNvPicPr>
+            <p:nvPr/>
+          </p:nvPicPr>
+          <p:blipFill rotWithShape="1">
+            <a:blip r:embed="rId8" cstate="print">
+              <a:extLst>
+                <a:ext uri="{28A0092B-C50C-407E-A947-70E740481C1C}">
+                  <a14:useLocalDpi xmlns:a14="http://schemas.microsoft.com/office/drawing/2010/main" val="0"/>
+                </a:ext>
+              </a:extLst>
+            </a:blip>
+            <a:srcRect l="45091" r="20513" b="30262"/>
+            <a:stretch/>
+          </p:blipFill>
+          <p:spPr>
+            <a:xfrm>
+              <a:off x="6342857" y="2946703"/>
+              <a:ext cx="247651" cy="669487"/>
+            </a:xfrm>
+            <a:prstGeom prst="rect">
+              <a:avLst/>
+            </a:prstGeom>
+          </p:spPr>
+        </p:pic>
+        <p:pic>
+          <p:nvPicPr>
+            <p:cNvPr id="73" name="Grafik 72"/>
+            <p:cNvPicPr>
+              <a:picLocks noChangeAspect="1"/>
+            </p:cNvPicPr>
+            <p:nvPr/>
+          </p:nvPicPr>
+          <p:blipFill rotWithShape="1">
+            <a:blip r:embed="rId8" cstate="print">
+              <a:extLst>
+                <a:ext uri="{28A0092B-C50C-407E-A947-70E740481C1C}">
+                  <a14:useLocalDpi xmlns:a14="http://schemas.microsoft.com/office/drawing/2010/main" val="0"/>
+                </a:ext>
+              </a:extLst>
+            </a:blip>
+            <a:srcRect l="36712" t="69457" r="28892" b="11080"/>
+            <a:stretch/>
+          </p:blipFill>
+          <p:spPr>
+            <a:xfrm>
+              <a:off x="6288957" y="3616327"/>
+              <a:ext cx="247651" cy="186846"/>
+            </a:xfrm>
+            <a:prstGeom prst="rect">
+              <a:avLst/>
+            </a:prstGeom>
+          </p:spPr>
+        </p:pic>
+      </p:grpSp>
+      <p:cxnSp>
+        <p:nvCxnSpPr>
+          <p:cNvPr id="83" name="Gerader Verbinder 82"/>
+          <p:cNvCxnSpPr/>
+          <p:nvPr/>
+        </p:nvCxnSpPr>
+        <p:spPr>
+          <a:xfrm>
+            <a:off x="6363170" y="3804246"/>
+            <a:ext cx="193063" cy="608122"/>
           </a:xfrm>
           <a:prstGeom prst="line">
             <a:avLst/>
@@ -3912,8 +4280,8 @@
         </p:nvCxnSpPr>
         <p:spPr>
           <a:xfrm flipH="1">
-            <a:off x="6677025" y="3814763"/>
-            <a:ext cx="85725" cy="597605"/>
+            <a:off x="6677028" y="3804246"/>
+            <a:ext cx="170558" cy="608122"/>
           </a:xfrm>
           <a:prstGeom prst="line">
             <a:avLst/>
@@ -3939,20 +4307,21 @@
           </a:fontRef>
         </p:style>
       </p:cxnSp>
-      <p:cxnSp>
-        <p:nvCxnSpPr>
-          <p:cNvPr id="83" name="Gerader Verbinder 82"/>
-          <p:cNvCxnSpPr/>
+      <p:sp>
+        <p:nvSpPr>
+          <p:cNvPr id="79" name="Rechteck 78"/>
+          <p:cNvSpPr/>
           <p:nvPr/>
-        </p:nvCxnSpPr>
+        </p:nvSpPr>
         <p:spPr>
           <a:xfrm>
-            <a:off x="6112971" y="3794836"/>
-            <a:ext cx="438490" cy="624901"/>
+            <a:off x="6361276" y="2908704"/>
+            <a:ext cx="488144" cy="897126"/>
           </a:xfrm>
-          <a:prstGeom prst="line">
+          <a:prstGeom prst="rect">
             <a:avLst/>
           </a:prstGeom>
+          <a:noFill/>
           <a:ln w="9525">
             <a:solidFill>
               <a:schemeClr val="tx1"/>
@@ -3960,20 +4329,403 @@
           </a:ln>
         </p:spPr>
         <p:style>
-          <a:lnRef idx="1">
-            <a:schemeClr val="accent1"/>
+          <a:lnRef idx="2">
+            <a:schemeClr val="accent1">
+              <a:shade val="50000"/>
+            </a:schemeClr>
           </a:lnRef>
-          <a:fillRef idx="0">
+          <a:fillRef idx="1">
             <a:schemeClr val="accent1"/>
           </a:fillRef>
           <a:effectRef idx="0">
             <a:schemeClr val="accent1"/>
           </a:effectRef>
           <a:fontRef idx="minor">
-            <a:schemeClr val="tx1"/>
+            <a:schemeClr val="lt1"/>
           </a:fontRef>
         </p:style>
-      </p:cxnSp>
+        <p:txBody>
+          <a:bodyPr rtlCol="0" anchor="ctr"/>
+          <a:lstStyle/>
+          <a:p>
+            <a:pPr algn="ctr"/>
+            <a:endParaRPr lang="en-GB"/>
+          </a:p>
+        </p:txBody>
+      </p:sp>
+      <p:grpSp>
+        <p:nvGrpSpPr>
+          <p:cNvPr id="75" name="Gruppieren 74"/>
+          <p:cNvGrpSpPr/>
+          <p:nvPr/>
+        </p:nvGrpSpPr>
+        <p:grpSpPr>
+          <a:xfrm>
+            <a:off x="2335659" y="5181805"/>
+            <a:ext cx="543831" cy="897126"/>
+            <a:chOff x="2262869" y="5181805"/>
+            <a:chExt cx="543831" cy="897126"/>
+          </a:xfrm>
+        </p:grpSpPr>
+        <p:pic>
+          <p:nvPicPr>
+            <p:cNvPr id="80" name="Grafik 79"/>
+            <p:cNvPicPr>
+              <a:picLocks noChangeAspect="1"/>
+            </p:cNvPicPr>
+            <p:nvPr/>
+          </p:nvPicPr>
+          <p:blipFill rotWithShape="1">
+            <a:blip r:embed="rId9" cstate="print">
+              <a:extLst>
+                <a:ext uri="{28A0092B-C50C-407E-A947-70E740481C1C}">
+                  <a14:useLocalDpi xmlns:a14="http://schemas.microsoft.com/office/drawing/2010/main" val="0"/>
+                </a:ext>
+              </a:extLst>
+            </a:blip>
+            <a:srcRect l="45210" r="16866" b="31145"/>
+            <a:stretch/>
+          </p:blipFill>
+          <p:spPr>
+            <a:xfrm>
+              <a:off x="2533650" y="5218423"/>
+              <a:ext cx="273050" cy="661013"/>
+            </a:xfrm>
+            <a:prstGeom prst="rect">
+              <a:avLst/>
+            </a:prstGeom>
+          </p:spPr>
+        </p:pic>
+        <p:pic>
+          <p:nvPicPr>
+            <p:cNvPr id="44" name="Grafik 43"/>
+            <p:cNvPicPr>
+              <a:picLocks noChangeAspect="1"/>
+            </p:cNvPicPr>
+            <p:nvPr/>
+          </p:nvPicPr>
+          <p:blipFill rotWithShape="1">
+            <a:blip r:embed="rId9" cstate="print">
+              <a:extLst>
+                <a:ext uri="{28A0092B-C50C-407E-A947-70E740481C1C}">
+                  <a14:useLocalDpi xmlns:a14="http://schemas.microsoft.com/office/drawing/2010/main" val="0"/>
+                </a:ext>
+              </a:extLst>
+            </a:blip>
+            <a:srcRect r="67267" b="31145"/>
+            <a:stretch/>
+          </p:blipFill>
+          <p:spPr>
+            <a:xfrm>
+              <a:off x="2313846" y="5214718"/>
+              <a:ext cx="235679" cy="661013"/>
+            </a:xfrm>
+            <a:prstGeom prst="rect">
+              <a:avLst/>
+            </a:prstGeom>
+          </p:spPr>
+        </p:pic>
+        <p:pic>
+          <p:nvPicPr>
+            <p:cNvPr id="45" name="Grafik 44"/>
+            <p:cNvPicPr>
+              <a:picLocks noChangeAspect="1"/>
+            </p:cNvPicPr>
+            <p:nvPr/>
+          </p:nvPicPr>
+          <p:blipFill rotWithShape="1">
+            <a:blip r:embed="rId9" cstate="print">
+              <a:extLst>
+                <a:ext uri="{28A0092B-C50C-407E-A947-70E740481C1C}">
+                  <a14:useLocalDpi xmlns:a14="http://schemas.microsoft.com/office/drawing/2010/main" val="0"/>
+                </a:ext>
+              </a:extLst>
+            </a:blip>
+            <a:srcRect l="38026" t="68194" r="32870" b="9978"/>
+            <a:stretch/>
+          </p:blipFill>
+          <p:spPr>
+            <a:xfrm>
+              <a:off x="2492377" y="5869381"/>
+              <a:ext cx="209550" cy="209550"/>
+            </a:xfrm>
+            <a:prstGeom prst="rect">
+              <a:avLst/>
+            </a:prstGeom>
+          </p:spPr>
+        </p:pic>
+        <p:sp>
+          <p:nvSpPr>
+            <p:cNvPr id="52" name="Rechteck 51"/>
+            <p:cNvSpPr/>
+            <p:nvPr/>
+          </p:nvSpPr>
+          <p:spPr>
+            <a:xfrm>
+              <a:off x="2262869" y="5181805"/>
+              <a:ext cx="543831" cy="897126"/>
+            </a:xfrm>
+            <a:prstGeom prst="rect">
+              <a:avLst/>
+            </a:prstGeom>
+            <a:noFill/>
+            <a:ln w="9525">
+              <a:solidFill>
+                <a:schemeClr val="tx1"/>
+              </a:solidFill>
+            </a:ln>
+          </p:spPr>
+          <p:style>
+            <a:lnRef idx="2">
+              <a:schemeClr val="accent1">
+                <a:shade val="50000"/>
+              </a:schemeClr>
+            </a:lnRef>
+            <a:fillRef idx="1">
+              <a:schemeClr val="accent1"/>
+            </a:fillRef>
+            <a:effectRef idx="0">
+              <a:schemeClr val="accent1"/>
+            </a:effectRef>
+            <a:fontRef idx="minor">
+              <a:schemeClr val="lt1"/>
+            </a:fontRef>
+          </p:style>
+          <p:txBody>
+            <a:bodyPr rtlCol="0" anchor="ctr"/>
+            <a:lstStyle/>
+            <a:p>
+              <a:pPr algn="ctr"/>
+              <a:endParaRPr lang="en-GB"/>
+            </a:p>
+          </p:txBody>
+        </p:sp>
+      </p:grpSp>
+      <p:grpSp>
+        <p:nvGrpSpPr>
+          <p:cNvPr id="89" name="Gruppieren 88"/>
+          <p:cNvGrpSpPr/>
+          <p:nvPr/>
+        </p:nvGrpSpPr>
+        <p:grpSpPr>
+          <a:xfrm>
+            <a:off x="4580997" y="5181805"/>
+            <a:ext cx="543831" cy="897126"/>
+            <a:chOff x="4373828" y="5181805"/>
+            <a:chExt cx="543831" cy="897126"/>
+          </a:xfrm>
+        </p:grpSpPr>
+        <p:pic>
+          <p:nvPicPr>
+            <p:cNvPr id="38" name="Grafik 37"/>
+            <p:cNvPicPr>
+              <a:picLocks noChangeAspect="1"/>
+            </p:cNvPicPr>
+            <p:nvPr/>
+          </p:nvPicPr>
+          <p:blipFill rotWithShape="1">
+            <a:blip r:embed="rId10" cstate="print">
+              <a:extLst>
+                <a:ext uri="{28A0092B-C50C-407E-A947-70E740481C1C}">
+                  <a14:useLocalDpi xmlns:a14="http://schemas.microsoft.com/office/drawing/2010/main" val="0"/>
+                </a:ext>
+              </a:extLst>
+            </a:blip>
+            <a:srcRect r="68369" b="32673"/>
+            <a:stretch/>
+          </p:blipFill>
+          <p:spPr>
+            <a:xfrm>
+              <a:off x="4398231" y="5214718"/>
+              <a:ext cx="227744" cy="646332"/>
+            </a:xfrm>
+            <a:prstGeom prst="rect">
+              <a:avLst/>
+            </a:prstGeom>
+          </p:spPr>
+        </p:pic>
+        <p:pic>
+          <p:nvPicPr>
+            <p:cNvPr id="85" name="Grafik 84"/>
+            <p:cNvPicPr>
+              <a:picLocks noChangeAspect="1"/>
+            </p:cNvPicPr>
+            <p:nvPr/>
+          </p:nvPicPr>
+          <p:blipFill rotWithShape="1">
+            <a:blip r:embed="rId10" cstate="print">
+              <a:extLst>
+                <a:ext uri="{28A0092B-C50C-407E-A947-70E740481C1C}">
+                  <a14:useLocalDpi xmlns:a14="http://schemas.microsoft.com/office/drawing/2010/main" val="0"/>
+                </a:ext>
+              </a:extLst>
+            </a:blip>
+            <a:srcRect l="56885" t="69120" r="11932" b="10496"/>
+            <a:stretch/>
+          </p:blipFill>
+          <p:spPr>
+            <a:xfrm>
+              <a:off x="4565607" y="5876507"/>
+              <a:ext cx="224516" cy="195681"/>
+            </a:xfrm>
+            <a:prstGeom prst="rect">
+              <a:avLst/>
+            </a:prstGeom>
+          </p:spPr>
+        </p:pic>
+        <p:pic>
+          <p:nvPicPr>
+            <p:cNvPr id="86" name="Grafik 85"/>
+            <p:cNvPicPr>
+              <a:picLocks noChangeAspect="1"/>
+            </p:cNvPicPr>
+            <p:nvPr/>
+          </p:nvPicPr>
+          <p:blipFill rotWithShape="1">
+            <a:blip r:embed="rId10" cstate="print">
+              <a:extLst>
+                <a:ext uri="{28A0092B-C50C-407E-A947-70E740481C1C}">
+                  <a14:useLocalDpi xmlns:a14="http://schemas.microsoft.com/office/drawing/2010/main" val="0"/>
+                </a:ext>
+              </a:extLst>
+            </a:blip>
+            <a:srcRect l="79743" t="64948" r="13906" b="30289"/>
+            <a:stretch/>
+          </p:blipFill>
+          <p:spPr>
+            <a:xfrm>
+              <a:off x="4738598" y="5839826"/>
+              <a:ext cx="45719" cy="45719"/>
+            </a:xfrm>
+            <a:prstGeom prst="rect">
+              <a:avLst/>
+            </a:prstGeom>
+          </p:spPr>
+        </p:pic>
+        <p:pic>
+          <p:nvPicPr>
+            <p:cNvPr id="84" name="Grafik 83"/>
+            <p:cNvPicPr>
+              <a:picLocks noChangeAspect="1"/>
+            </p:cNvPicPr>
+            <p:nvPr/>
+          </p:nvPicPr>
+          <p:blipFill rotWithShape="1">
+            <a:blip r:embed="rId10" cstate="print">
+              <a:extLst>
+                <a:ext uri="{28A0092B-C50C-407E-A947-70E740481C1C}">
+                  <a14:useLocalDpi xmlns:a14="http://schemas.microsoft.com/office/drawing/2010/main" val="0"/>
+                </a:ext>
+              </a:extLst>
+            </a:blip>
+            <a:srcRect l="63500" t="-1" b="34586"/>
+            <a:stretch/>
+          </p:blipFill>
+          <p:spPr>
+            <a:xfrm>
+              <a:off x="4620534" y="5217893"/>
+              <a:ext cx="262800" cy="627979"/>
+            </a:xfrm>
+            <a:prstGeom prst="rect">
+              <a:avLst/>
+            </a:prstGeom>
+          </p:spPr>
+        </p:pic>
+        <p:sp>
+          <p:nvSpPr>
+            <p:cNvPr id="87" name="Rechteck 86"/>
+            <p:cNvSpPr/>
+            <p:nvPr/>
+          </p:nvSpPr>
+          <p:spPr>
+            <a:xfrm>
+              <a:off x="4618822" y="5845574"/>
+              <a:ext cx="118086" cy="28800"/>
+            </a:xfrm>
+            <a:prstGeom prst="rect">
+              <a:avLst/>
+            </a:prstGeom>
+            <a:solidFill>
+              <a:schemeClr val="bg1"/>
+            </a:solidFill>
+            <a:ln>
+              <a:solidFill>
+                <a:schemeClr val="bg1"/>
+              </a:solidFill>
+            </a:ln>
+          </p:spPr>
+          <p:style>
+            <a:lnRef idx="2">
+              <a:schemeClr val="accent1">
+                <a:shade val="50000"/>
+              </a:schemeClr>
+            </a:lnRef>
+            <a:fillRef idx="1">
+              <a:schemeClr val="accent1"/>
+            </a:fillRef>
+            <a:effectRef idx="0">
+              <a:schemeClr val="accent1"/>
+            </a:effectRef>
+            <a:fontRef idx="minor">
+              <a:schemeClr val="lt1"/>
+            </a:fontRef>
+          </p:style>
+          <p:txBody>
+            <a:bodyPr rtlCol="0" anchor="ctr"/>
+            <a:lstStyle/>
+            <a:p>
+              <a:pPr algn="ctr"/>
+              <a:endParaRPr lang="en-GB"/>
+            </a:p>
+          </p:txBody>
+        </p:sp>
+        <p:sp>
+          <p:nvSpPr>
+            <p:cNvPr id="88" name="Rechteck 87"/>
+            <p:cNvSpPr/>
+            <p:nvPr/>
+          </p:nvSpPr>
+          <p:spPr>
+            <a:xfrm>
+              <a:off x="4373828" y="5181805"/>
+              <a:ext cx="543831" cy="897126"/>
+            </a:xfrm>
+            <a:prstGeom prst="rect">
+              <a:avLst/>
+            </a:prstGeom>
+            <a:noFill/>
+            <a:ln w="9525">
+              <a:solidFill>
+                <a:schemeClr val="tx1"/>
+              </a:solidFill>
+            </a:ln>
+          </p:spPr>
+          <p:style>
+            <a:lnRef idx="2">
+              <a:schemeClr val="accent1">
+                <a:shade val="50000"/>
+              </a:schemeClr>
+            </a:lnRef>
+            <a:fillRef idx="1">
+              <a:schemeClr val="accent1"/>
+            </a:fillRef>
+            <a:effectRef idx="0">
+              <a:schemeClr val="accent1"/>
+            </a:effectRef>
+            <a:fontRef idx="minor">
+              <a:schemeClr val="lt1"/>
+            </a:fontRef>
+          </p:style>
+          <p:txBody>
+            <a:bodyPr rtlCol="0" anchor="ctr"/>
+            <a:lstStyle/>
+            <a:p>
+              <a:pPr algn="ctr"/>
+              <a:endParaRPr lang="en-GB"/>
+            </a:p>
+          </p:txBody>
+        </p:sp>
+      </p:grpSp>
     </p:spTree>
     <p:extLst>
       <p:ext uri="{BB962C8B-B14F-4D97-AF65-F5344CB8AC3E}">

</xml_diff>